<commit_message>
add bootstrap fig to poster
</commit_message>
<xml_diff>
--- a/presentations/HTRC-2018/poster-template.pptx
+++ b/presentations/HTRC-2018/poster-template.pptx
@@ -109,7 +109,7 @@
   </p:defaultTextStyle>
   <p:extLst>
     <p:ext uri="{EFAFB233-063F-42B5-8137-9DF3F51BA10A}">
-      <p15:sldGuideLst xmlns="" xmlns:p15="http://schemas.microsoft.com/office/powerpoint/2012/main">
+      <p15:sldGuideLst xmlns:p15="http://schemas.microsoft.com/office/powerpoint/2012/main">
         <p15:guide id="1" orient="horz" pos="6912">
           <p15:clr>
             <a:srgbClr val="A4A3A4"/>
@@ -123,7 +123,7 @@
       </p15:sldGuideLst>
     </p:ext>
     <p:ext uri="{2D200454-40CA-4A62-9FC3-DE9A4176ACB9}">
-      <p15:notesGuideLst xmlns="" xmlns:p15="http://schemas.microsoft.com/office/powerpoint/2012/main">
+      <p15:notesGuideLst xmlns:p15="http://schemas.microsoft.com/office/powerpoint/2012/main">
         <p15:guide id="1" orient="horz" pos="2926">
           <p15:clr>
             <a:srgbClr val="A4A3A4"/>
@@ -222,7 +222,7 @@
           <a:p>
             <a:fld id="{FF66CDD7-09B6-4BB3-9069-2B95837CCCB2}" type="datetimeFigureOut">
               <a:rPr lang="en-US" smtClean="0"/>
-              <a:t>1/17/2018</a:t>
+              <a:t>1/18/18</a:t>
             </a:fld>
             <a:endParaRPr lang="en-US"/>
           </a:p>
@@ -436,7 +436,7 @@
           <a:p>
             <a:fld id="{985D6BDF-9D0E-4E2B-85B8-D8F4790360C9}" type="datetimeFigureOut">
               <a:rPr lang="en-US" smtClean="0"/>
-              <a:t>1/17/2018</a:t>
+              <a:t>1/18/18</a:t>
             </a:fld>
             <a:endParaRPr lang="en-US" dirty="0"/>
           </a:p>
@@ -601,7 +601,7 @@
           <a:p>
             <a:fld id="{985D6BDF-9D0E-4E2B-85B8-D8F4790360C9}" type="datetimeFigureOut">
               <a:rPr lang="en-US" smtClean="0"/>
-              <a:t>1/17/2018</a:t>
+              <a:t>1/18/18</a:t>
             </a:fld>
             <a:endParaRPr lang="en-US" dirty="0"/>
           </a:p>
@@ -776,7 +776,7 @@
           <a:p>
             <a:fld id="{985D6BDF-9D0E-4E2B-85B8-D8F4790360C9}" type="datetimeFigureOut">
               <a:rPr lang="en-US" smtClean="0"/>
-              <a:t>1/17/2018</a:t>
+              <a:t>1/18/18</a:t>
             </a:fld>
             <a:endParaRPr lang="en-US" dirty="0"/>
           </a:p>
@@ -2451,7 +2451,7 @@
           <a:p>
             <a:fld id="{985D6BDF-9D0E-4E2B-85B8-D8F4790360C9}" type="datetimeFigureOut">
               <a:rPr lang="en-US" smtClean="0"/>
-              <a:t>1/17/2018</a:t>
+              <a:t>1/18/18</a:t>
             </a:fld>
             <a:endParaRPr lang="en-US" dirty="0"/>
           </a:p>
@@ -2692,7 +2692,7 @@
           <a:p>
             <a:fld id="{985D6BDF-9D0E-4E2B-85B8-D8F4790360C9}" type="datetimeFigureOut">
               <a:rPr lang="en-US" smtClean="0"/>
-              <a:t>1/17/2018</a:t>
+              <a:t>1/18/18</a:t>
             </a:fld>
             <a:endParaRPr lang="en-US" dirty="0"/>
           </a:p>
@@ -2919,7 +2919,7 @@
           <a:p>
             <a:fld id="{985D6BDF-9D0E-4E2B-85B8-D8F4790360C9}" type="datetimeFigureOut">
               <a:rPr lang="en-US" smtClean="0"/>
-              <a:t>1/17/2018</a:t>
+              <a:t>1/18/18</a:t>
             </a:fld>
             <a:endParaRPr lang="en-US" dirty="0"/>
           </a:p>
@@ -3281,7 +3281,7 @@
           <a:p>
             <a:fld id="{985D6BDF-9D0E-4E2B-85B8-D8F4790360C9}" type="datetimeFigureOut">
               <a:rPr lang="en-US" smtClean="0"/>
-              <a:t>1/17/2018</a:t>
+              <a:t>1/18/18</a:t>
             </a:fld>
             <a:endParaRPr lang="en-US" dirty="0"/>
           </a:p>
@@ -3394,7 +3394,7 @@
           <a:p>
             <a:fld id="{985D6BDF-9D0E-4E2B-85B8-D8F4790360C9}" type="datetimeFigureOut">
               <a:rPr lang="en-US" smtClean="0"/>
-              <a:t>1/17/2018</a:t>
+              <a:t>1/18/18</a:t>
             </a:fld>
             <a:endParaRPr lang="en-US" dirty="0"/>
           </a:p>
@@ -3484,7 +3484,7 @@
           <a:p>
             <a:fld id="{985D6BDF-9D0E-4E2B-85B8-D8F4790360C9}" type="datetimeFigureOut">
               <a:rPr lang="en-US" smtClean="0"/>
-              <a:t>1/17/2018</a:t>
+              <a:t>1/18/18</a:t>
             </a:fld>
             <a:endParaRPr lang="en-US" dirty="0"/>
           </a:p>
@@ -3756,7 +3756,7 @@
           <a:p>
             <a:fld id="{985D6BDF-9D0E-4E2B-85B8-D8F4790360C9}" type="datetimeFigureOut">
               <a:rPr lang="en-US" smtClean="0"/>
-              <a:t>1/17/2018</a:t>
+              <a:t>1/18/18</a:t>
             </a:fld>
             <a:endParaRPr lang="en-US" dirty="0"/>
           </a:p>
@@ -4004,7 +4004,7 @@
           <a:p>
             <a:fld id="{985D6BDF-9D0E-4E2B-85B8-D8F4790360C9}" type="datetimeFigureOut">
               <a:rPr lang="en-US" smtClean="0"/>
-              <a:t>1/17/2018</a:t>
+              <a:t>1/18/18</a:t>
             </a:fld>
             <a:endParaRPr lang="en-US" dirty="0"/>
           </a:p>
@@ -4212,7 +4212,7 @@
           <a:p>
             <a:fld id="{985D6BDF-9D0E-4E2B-85B8-D8F4790360C9}" type="datetimeFigureOut">
               <a:rPr lang="en-US" smtClean="0"/>
-              <a:t>1/17/2018</a:t>
+              <a:t>1/18/18</a:t>
             </a:fld>
             <a:endParaRPr lang="en-US" dirty="0"/>
           </a:p>
@@ -5496,9 +5496,6 @@
               </a:rPr>
               <a:t>- Ancient Mesopotamia (present-day Iraq); ca 1900-1200 BCE</a:t>
             </a:r>
-            <a:endParaRPr lang="en-US" sz="2000" dirty="0" smtClean="0">
-              <a:latin typeface="Calibri" pitchFamily="34" charset="0"/>
-            </a:endParaRPr>
           </a:p>
           <a:p>
             <a:pPr marL="57150" indent="-342900" eaLnBrk="1" hangingPunct="1">
@@ -5527,13 +5524,7 @@
               <a:rPr lang="en-US" sz="2000" dirty="0" smtClean="0">
                 <a:latin typeface="Calibri" pitchFamily="34" charset="0"/>
               </a:rPr>
-              <a:t>; each section includes related words (for instance: parts of a chariot). The order of sections also changes over time</a:t>
-            </a:r>
-            <a:r>
-              <a:rPr lang="en-US" sz="2000" dirty="0" smtClean="0">
-                <a:latin typeface="Calibri" pitchFamily="34" charset="0"/>
-              </a:rPr>
-              <a:t>.</a:t>
+              <a:t>; each section includes related words (for instance: parts of a chariot). The order of sections also changes over time.</a:t>
             </a:r>
           </a:p>
           <a:p>
@@ -5584,13 +5575,7 @@
               <a:rPr lang="en-US" sz="2000" dirty="0" smtClean="0">
                 <a:latin typeface="Calibri" pitchFamily="34" charset="0"/>
               </a:rPr>
-              <a:t> within the entire text</a:t>
-            </a:r>
-            <a:r>
-              <a:rPr lang="en-US" sz="2000" dirty="0" smtClean="0">
-                <a:latin typeface="Calibri" pitchFamily="34" charset="0"/>
-              </a:rPr>
-              <a:t>.</a:t>
+              <a:t> within the entire text.</a:t>
             </a:r>
           </a:p>
           <a:p>
@@ -6552,64 +6537,34 @@
                 </a:solidFill>
                 <a:latin typeface="+mn-lt"/>
               </a:rPr>
-              <a:t> data, </a:t>
-            </a:r>
-            <a:r>
-              <a:rPr lang="en-US" sz="2000" dirty="0" smtClean="0">
-                <a:solidFill>
-                  <a:prstClr val="black"/>
-                </a:solidFill>
-                <a:latin typeface="+mn-lt"/>
-              </a:rPr>
-              <a:t>made available by </a:t>
+              <a:t> data, made available by </a:t>
             </a:r>
             <a:r>
               <a:rPr lang="en-US" sz="2000" dirty="0" smtClean="0">
                 <a:latin typeface="+mn-lt"/>
               </a:rPr>
-              <a:t>ORACC </a:t>
+              <a:t>ORACC in </a:t>
+            </a:r>
+            <a:r>
+              <a:rPr lang="en-US" sz="2000" dirty="0">
+                <a:latin typeface="+mn-lt"/>
+              </a:rPr>
+              <a:t>JSON </a:t>
             </a:r>
             <a:r>
               <a:rPr lang="en-US" sz="2000" dirty="0" smtClean="0">
                 <a:latin typeface="+mn-lt"/>
               </a:rPr>
-              <a:t>in </a:t>
-            </a:r>
-            <a:r>
-              <a:rPr lang="en-US" sz="2000" dirty="0">
+              <a:t>format, is used in the analysis. Data consist of c</a:t>
+            </a:r>
+            <a:r>
+              <a:rPr lang="en-US" sz="2000" dirty="0" smtClean="0">
+                <a:solidFill>
+                  <a:prstClr val="black"/>
+                </a:solidFill>
                 <a:latin typeface="+mn-lt"/>
               </a:rPr>
-              <a:t>JSON </a:t>
-            </a:r>
-            <a:r>
-              <a:rPr lang="en-US" sz="2000" dirty="0" smtClean="0">
-                <a:latin typeface="+mn-lt"/>
-              </a:rPr>
-              <a:t>format, </a:t>
-            </a:r>
-            <a:r>
-              <a:rPr lang="en-US" sz="2000" dirty="0" smtClean="0">
-                <a:latin typeface="+mn-lt"/>
-              </a:rPr>
-              <a:t>is used in the analysis. Data consist of c</a:t>
-            </a:r>
-            <a:r>
-              <a:rPr lang="en-US" sz="2000" dirty="0" smtClean="0">
-                <a:solidFill>
-                  <a:prstClr val="black"/>
-                </a:solidFill>
-                <a:latin typeface="+mn-lt"/>
-              </a:rPr>
-              <a:t>a. 135 exemplars of the list of trees and wooden objects, ranging from 2 to 750 lines in length. The data is arranged in a DTM (Document-Term Matrix) for comparison of the </a:t>
-            </a:r>
-            <a:r>
-              <a:rPr lang="en-US" sz="2000" dirty="0" smtClean="0">
-                <a:solidFill>
-                  <a:prstClr val="black"/>
-                </a:solidFill>
-                <a:latin typeface="+mn-lt"/>
-              </a:rPr>
-              <a:t>documents on </a:t>
+              <a:t>a. 135 exemplars of the list of trees and wooden objects, ranging from 2 to 750 lines in length. The data is arranged in a DTM (Document-Term Matrix) for comparison of the documents on </a:t>
             </a:r>
             <a:r>
               <a:rPr lang="en-US" sz="2000" b="1" dirty="0" smtClean="0">
@@ -7171,11 +7126,7 @@
                     <a:p>
                       <a:r>
                         <a:rPr lang="en-US" sz="2000" dirty="0" smtClean="0"/>
-                        <a:t>Exemplar </a:t>
-                      </a:r>
-                      <a:r>
-                        <a:rPr lang="en-US" sz="2000" dirty="0" smtClean="0"/>
-                        <a:t>1</a:t>
+                        <a:t>Exemplar 1</a:t>
                       </a:r>
                       <a:endParaRPr lang="en-US" sz="2000" dirty="0"/>
                     </a:p>
@@ -7247,11 +7198,7 @@
                     <a:p>
                       <a:r>
                         <a:rPr lang="en-US" sz="2000" dirty="0" smtClean="0"/>
-                        <a:t>Exemplar </a:t>
-                      </a:r>
-                      <a:r>
-                        <a:rPr lang="en-US" sz="2000" dirty="0" smtClean="0"/>
-                        <a:t>2</a:t>
+                        <a:t>Exemplar 2</a:t>
                       </a:r>
                       <a:endParaRPr lang="en-US" sz="2000" dirty="0"/>
                     </a:p>
@@ -7323,11 +7270,7 @@
                     <a:p>
                       <a:r>
                         <a:rPr lang="en-US" sz="2000" dirty="0" smtClean="0"/>
-                        <a:t>Exemplar </a:t>
-                      </a:r>
-                      <a:r>
-                        <a:rPr lang="en-US" sz="2000" dirty="0" smtClean="0"/>
-                        <a:t>3</a:t>
+                        <a:t>Exemplar 3</a:t>
                       </a:r>
                       <a:endParaRPr lang="en-US" sz="2000" dirty="0"/>
                     </a:p>
@@ -7620,6 +7563,36 @@
           </a:p>
         </p:txBody>
       </p:sp>
+      <p:pic>
+        <p:nvPicPr>
+          <p:cNvPr id="8" name="Picture 7"/>
+          <p:cNvPicPr>
+            <a:picLocks noChangeAspect="1"/>
+          </p:cNvPicPr>
+          <p:nvPr/>
+        </p:nvPicPr>
+        <p:blipFill>
+          <a:blip r:embed="rId7">
+            <a:extLst>
+              <a:ext uri="{28A0092B-C50C-407E-A947-70E740481C1C}">
+                <a14:useLocalDpi xmlns:a14="http://schemas.microsoft.com/office/drawing/2010/main" val="0"/>
+              </a:ext>
+            </a:extLst>
+          </a:blip>
+          <a:stretch>
+            <a:fillRect/>
+          </a:stretch>
+        </p:blipFill>
+        <p:spPr>
+          <a:xfrm>
+            <a:off x="11496040" y="7445706"/>
+            <a:ext cx="6267577" cy="8093891"/>
+          </a:xfrm>
+          <a:prstGeom prst="rect">
+            <a:avLst/>
+          </a:prstGeom>
+        </p:spPr>
+      </p:pic>
     </p:spTree>
     <p:extLst>
       <p:ext uri="{BB962C8B-B14F-4D97-AF65-F5344CB8AC3E}">
@@ -7895,7 +7868,7 @@
   <a:extraClrSchemeLst/>
   <a:extLst>
     <a:ext uri="{05A4C25C-085E-4340-85A3-A5531E510DB2}">
-      <thm15:themeFamily xmlns="" xmlns:thm15="http://schemas.microsoft.com/office/thememl/2012/main" name="Office Theme" id="{62F939B6-93AF-4DB8-9C6B-D6C7DFDC589F}" vid="{4A3C46E8-61CC-4603-A589-7422A47A8E4A}"/>
+      <thm15:themeFamily xmlns:thm15="http://schemas.microsoft.com/office/thememl/2012/main" name="Office Theme" id="{62F939B6-93AF-4DB8-9C6B-D6C7DFDC589F}" vid="{4A3C46E8-61CC-4603-A589-7422A47A8E4A}"/>
     </a:ext>
   </a:extLst>
 </a:theme>

</xml_diff>

<commit_message>
poster names and titles
</commit_message>
<xml_diff>
--- a/presentations/HTRC-2018/poster-template.pptx
+++ b/presentations/HTRC-2018/poster-template.pptx
@@ -109,7 +109,7 @@
   </p:defaultTextStyle>
   <p:extLst>
     <p:ext uri="{EFAFB233-063F-42B5-8137-9DF3F51BA10A}">
-      <p15:sldGuideLst xmlns:p15="http://schemas.microsoft.com/office/powerpoint/2012/main">
+      <p15:sldGuideLst xmlns:p15="http://schemas.microsoft.com/office/powerpoint/2012/main" xmlns="">
         <p15:guide id="1" orient="horz" pos="6912">
           <p15:clr>
             <a:srgbClr val="A4A3A4"/>
@@ -123,7 +123,7 @@
       </p15:sldGuideLst>
     </p:ext>
     <p:ext uri="{2D200454-40CA-4A62-9FC3-DE9A4176ACB9}">
-      <p15:notesGuideLst xmlns:p15="http://schemas.microsoft.com/office/powerpoint/2012/main">
+      <p15:notesGuideLst xmlns:p15="http://schemas.microsoft.com/office/powerpoint/2012/main" xmlns="">
         <p15:guide id="1" orient="horz" pos="2926">
           <p15:clr>
             <a:srgbClr val="A4A3A4"/>
@@ -222,7 +222,7 @@
           <a:p>
             <a:fld id="{FF66CDD7-09B6-4BB3-9069-2B95837CCCB2}" type="datetimeFigureOut">
               <a:rPr lang="en-US" smtClean="0"/>
-              <a:t>1/18/18</a:t>
+              <a:t>1/22/2018</a:t>
             </a:fld>
             <a:endParaRPr lang="en-US"/>
           </a:p>
@@ -436,7 +436,7 @@
           <a:p>
             <a:fld id="{985D6BDF-9D0E-4E2B-85B8-D8F4790360C9}" type="datetimeFigureOut">
               <a:rPr lang="en-US" smtClean="0"/>
-              <a:t>1/18/18</a:t>
+              <a:t>1/22/2018</a:t>
             </a:fld>
             <a:endParaRPr lang="en-US" dirty="0"/>
           </a:p>
@@ -601,7 +601,7 @@
           <a:p>
             <a:fld id="{985D6BDF-9D0E-4E2B-85B8-D8F4790360C9}" type="datetimeFigureOut">
               <a:rPr lang="en-US" smtClean="0"/>
-              <a:t>1/18/18</a:t>
+              <a:t>1/22/2018</a:t>
             </a:fld>
             <a:endParaRPr lang="en-US" dirty="0"/>
           </a:p>
@@ -776,7 +776,7 @@
           <a:p>
             <a:fld id="{985D6BDF-9D0E-4E2B-85B8-D8F4790360C9}" type="datetimeFigureOut">
               <a:rPr lang="en-US" smtClean="0"/>
-              <a:t>1/18/18</a:t>
+              <a:t>1/22/2018</a:t>
             </a:fld>
             <a:endParaRPr lang="en-US" dirty="0"/>
           </a:p>
@@ -2451,7 +2451,7 @@
           <a:p>
             <a:fld id="{985D6BDF-9D0E-4E2B-85B8-D8F4790360C9}" type="datetimeFigureOut">
               <a:rPr lang="en-US" smtClean="0"/>
-              <a:t>1/18/18</a:t>
+              <a:t>1/22/2018</a:t>
             </a:fld>
             <a:endParaRPr lang="en-US" dirty="0"/>
           </a:p>
@@ -2692,7 +2692,7 @@
           <a:p>
             <a:fld id="{985D6BDF-9D0E-4E2B-85B8-D8F4790360C9}" type="datetimeFigureOut">
               <a:rPr lang="en-US" smtClean="0"/>
-              <a:t>1/18/18</a:t>
+              <a:t>1/22/2018</a:t>
             </a:fld>
             <a:endParaRPr lang="en-US" dirty="0"/>
           </a:p>
@@ -2919,7 +2919,7 @@
           <a:p>
             <a:fld id="{985D6BDF-9D0E-4E2B-85B8-D8F4790360C9}" type="datetimeFigureOut">
               <a:rPr lang="en-US" smtClean="0"/>
-              <a:t>1/18/18</a:t>
+              <a:t>1/22/2018</a:t>
             </a:fld>
             <a:endParaRPr lang="en-US" dirty="0"/>
           </a:p>
@@ -3281,7 +3281,7 @@
           <a:p>
             <a:fld id="{985D6BDF-9D0E-4E2B-85B8-D8F4790360C9}" type="datetimeFigureOut">
               <a:rPr lang="en-US" smtClean="0"/>
-              <a:t>1/18/18</a:t>
+              <a:t>1/22/2018</a:t>
             </a:fld>
             <a:endParaRPr lang="en-US" dirty="0"/>
           </a:p>
@@ -3394,7 +3394,7 @@
           <a:p>
             <a:fld id="{985D6BDF-9D0E-4E2B-85B8-D8F4790360C9}" type="datetimeFigureOut">
               <a:rPr lang="en-US" smtClean="0"/>
-              <a:t>1/18/18</a:t>
+              <a:t>1/22/2018</a:t>
             </a:fld>
             <a:endParaRPr lang="en-US" dirty="0"/>
           </a:p>
@@ -3484,7 +3484,7 @@
           <a:p>
             <a:fld id="{985D6BDF-9D0E-4E2B-85B8-D8F4790360C9}" type="datetimeFigureOut">
               <a:rPr lang="en-US" smtClean="0"/>
-              <a:t>1/18/18</a:t>
+              <a:t>1/22/2018</a:t>
             </a:fld>
             <a:endParaRPr lang="en-US" dirty="0"/>
           </a:p>
@@ -3756,7 +3756,7 @@
           <a:p>
             <a:fld id="{985D6BDF-9D0E-4E2B-85B8-D8F4790360C9}" type="datetimeFigureOut">
               <a:rPr lang="en-US" smtClean="0"/>
-              <a:t>1/18/18</a:t>
+              <a:t>1/22/2018</a:t>
             </a:fld>
             <a:endParaRPr lang="en-US" dirty="0"/>
           </a:p>
@@ -4004,7 +4004,7 @@
           <a:p>
             <a:fld id="{985D6BDF-9D0E-4E2B-85B8-D8F4790360C9}" type="datetimeFigureOut">
               <a:rPr lang="en-US" smtClean="0"/>
-              <a:t>1/18/18</a:t>
+              <a:t>1/22/2018</a:t>
             </a:fld>
             <a:endParaRPr lang="en-US" dirty="0"/>
           </a:p>
@@ -4212,7 +4212,7 @@
           <a:p>
             <a:fld id="{985D6BDF-9D0E-4E2B-85B8-D8F4790360C9}" type="datetimeFigureOut">
               <a:rPr lang="en-US" smtClean="0"/>
-              <a:t>1/18/18</a:t>
+              <a:t>1/22/2018</a:t>
             </a:fld>
             <a:endParaRPr lang="en-US" dirty="0"/>
           </a:p>
@@ -5022,7 +5022,79 @@
                 </a:solidFill>
                 <a:latin typeface="+mn-lt"/>
               </a:rPr>
-              <a:t>Erin Becker, Software Carpentry and  Niek Veldhuis, UC Berkeley, Department of Near Eastern Studies</a:t>
+              <a:t>Erin Becker, </a:t>
+            </a:r>
+            <a:r>
+              <a:rPr lang="en-US" sz="2800" dirty="0" smtClean="0">
+                <a:solidFill>
+                  <a:schemeClr val="accent3">
+                    <a:lumMod val="20000"/>
+                    <a:lumOff val="80000"/>
+                  </a:schemeClr>
+                </a:solidFill>
+                <a:latin typeface="+mn-lt"/>
+              </a:rPr>
+              <a:t>Associate Director, The </a:t>
+            </a:r>
+            <a:r>
+              <a:rPr lang="en-US" sz="2800" smtClean="0">
+                <a:solidFill>
+                  <a:schemeClr val="accent3">
+                    <a:lumMod val="20000"/>
+                    <a:lumOff val="80000"/>
+                  </a:schemeClr>
+                </a:solidFill>
+                <a:latin typeface="+mn-lt"/>
+              </a:rPr>
+              <a:t>Carpentries and </a:t>
+            </a:r>
+            <a:r>
+              <a:rPr lang="en-US" sz="2800" dirty="0" smtClean="0">
+                <a:solidFill>
+                  <a:schemeClr val="accent3">
+                    <a:lumMod val="20000"/>
+                    <a:lumOff val="80000"/>
+                  </a:schemeClr>
+                </a:solidFill>
+                <a:latin typeface="+mn-lt"/>
+              </a:rPr>
+              <a:t>Niek Veldhuis, </a:t>
+            </a:r>
+            <a:r>
+              <a:rPr lang="en-US" sz="2800" dirty="0" smtClean="0">
+                <a:solidFill>
+                  <a:schemeClr val="accent3">
+                    <a:lumMod val="20000"/>
+                    <a:lumOff val="80000"/>
+                  </a:schemeClr>
+                </a:solidFill>
+                <a:latin typeface="+mn-lt"/>
+              </a:rPr>
+              <a:t>Professor </a:t>
+            </a:r>
+            <a:r>
+              <a:rPr lang="en-US" sz="2800" smtClean="0">
+                <a:solidFill>
+                  <a:schemeClr val="accent3">
+                    <a:lumMod val="20000"/>
+                    <a:lumOff val="80000"/>
+                  </a:schemeClr>
+                </a:solidFill>
+                <a:latin typeface="+mn-lt"/>
+              </a:rPr>
+              <a:t>of Assyriology, UC </a:t>
+            </a:r>
+            <a:r>
+              <a:rPr lang="en-US" sz="2800" dirty="0" smtClean="0">
+                <a:solidFill>
+                  <a:schemeClr val="accent3">
+                    <a:lumMod val="20000"/>
+                    <a:lumOff val="80000"/>
+                  </a:schemeClr>
+                </a:solidFill>
+                <a:latin typeface="+mn-lt"/>
+              </a:rPr>
+              <a:t>Berkeley, Department of Near Eastern Studies</a:t>
             </a:r>
             <a:endParaRPr lang="en-US" sz="2800" baseline="30000" dirty="0">
               <a:solidFill>
@@ -7549,15 +7621,15 @@
           <a:p>
             <a:r>
               <a:rPr lang="en-US" sz="1600" dirty="0" smtClean="0"/>
-              <a:t>The section “bow” is defined by a sequence of lemmas that share a sequence of at least 3 characters either in the Sumerian Citation Form or in the English Guide Word. Square brackets and Part of Speech are ignored. The word for “</a:t>
-            </a:r>
-            <a:r>
-              <a:rPr lang="en-US" sz="1600" dirty="0" err="1" smtClean="0"/>
-              <a:t>trap”is</a:t>
+              <a:t>The section “bow” is defined by a sequence of lemmas that share a sequence of at least 3 characters either in the Sumerian Citation Form or in the English Guide Word. Square brackets and Part of Speech are ignored. The word for “trap</a:t>
             </a:r>
             <a:r>
               <a:rPr lang="en-US" sz="1600" dirty="0" smtClean="0"/>
-              <a:t> the beginning of a new section</a:t>
+              <a:t>” is </a:t>
+            </a:r>
+            <a:r>
+              <a:rPr lang="en-US" sz="1600" dirty="0" smtClean="0"/>
+              <a:t>the beginning of a new section</a:t>
             </a:r>
             <a:endParaRPr lang="en-US" sz="1600" dirty="0"/>
           </a:p>
@@ -7868,7 +7940,7 @@
   <a:extraClrSchemeLst/>
   <a:extLst>
     <a:ext uri="{05A4C25C-085E-4340-85A3-A5531E510DB2}">
-      <thm15:themeFamily xmlns:thm15="http://schemas.microsoft.com/office/thememl/2012/main" name="Office Theme" id="{62F939B6-93AF-4DB8-9C6B-D6C7DFDC589F}" vid="{4A3C46E8-61CC-4603-A589-7422A47A8E4A}"/>
+      <thm15:themeFamily xmlns:thm15="http://schemas.microsoft.com/office/thememl/2012/main" xmlns="" name="Office Theme" id="{62F939B6-93AF-4DB8-9C6B-D6C7DFDC589F}" vid="{4A3C46E8-61CC-4603-A589-7422A47A8E4A}"/>
     </a:ext>
   </a:extLst>
 </a:theme>

</xml_diff>

<commit_message>
poster names and logos
</commit_message>
<xml_diff>
--- a/presentations/HTRC-2018/poster-template.pptx
+++ b/presentations/HTRC-2018/poster-template.pptx
@@ -5022,10 +5022,10 @@
                 </a:solidFill>
                 <a:latin typeface="+mn-lt"/>
               </a:rPr>
-              <a:t>Erin Becker, </a:t>
-            </a:r>
-            <a:r>
-              <a:rPr lang="en-US" sz="2800" dirty="0" smtClean="0">
+              <a:t>Erin Becker, Associate Director, The </a:t>
+            </a:r>
+            <a:r>
+              <a:rPr lang="en-US" sz="2800" smtClean="0">
                 <a:solidFill>
                   <a:schemeClr val="accent3">
                     <a:lumMod val="20000"/>
@@ -5034,10 +5034,10 @@
                 </a:solidFill>
                 <a:latin typeface="+mn-lt"/>
               </a:rPr>
-              <a:t>Associate Director, The </a:t>
-            </a:r>
-            <a:r>
-              <a:rPr lang="en-US" sz="2800" smtClean="0">
+              <a:t>Carpentries and </a:t>
+            </a:r>
+            <a:r>
+              <a:rPr lang="en-US" sz="2800" dirty="0" smtClean="0">
                 <a:solidFill>
                   <a:schemeClr val="accent3">
                     <a:lumMod val="20000"/>
@@ -5046,31 +5046,7 @@
                 </a:solidFill>
                 <a:latin typeface="+mn-lt"/>
               </a:rPr>
-              <a:t>Carpentries and </a:t>
-            </a:r>
-            <a:r>
-              <a:rPr lang="en-US" sz="2800" dirty="0" smtClean="0">
-                <a:solidFill>
-                  <a:schemeClr val="accent3">
-                    <a:lumMod val="20000"/>
-                    <a:lumOff val="80000"/>
-                  </a:schemeClr>
-                </a:solidFill>
-                <a:latin typeface="+mn-lt"/>
-              </a:rPr>
-              <a:t>Niek Veldhuis, </a:t>
-            </a:r>
-            <a:r>
-              <a:rPr lang="en-US" sz="2800" dirty="0" smtClean="0">
-                <a:solidFill>
-                  <a:schemeClr val="accent3">
-                    <a:lumMod val="20000"/>
-                    <a:lumOff val="80000"/>
-                  </a:schemeClr>
-                </a:solidFill>
-                <a:latin typeface="+mn-lt"/>
-              </a:rPr>
-              <a:t>Professor </a:t>
+              <a:t>Niek Veldhuis, Professor </a:t>
             </a:r>
             <a:r>
               <a:rPr lang="en-US" sz="2800" smtClean="0">
@@ -5117,7 +5093,7 @@
         <p:spPr>
           <a:xfrm>
             <a:off x="1280162" y="20025361"/>
-            <a:ext cx="2171325" cy="1588333"/>
+            <a:ext cx="7770550" cy="1280556"/>
           </a:xfrm>
           <a:prstGeom prst="rect">
             <a:avLst/>
@@ -5136,33 +5112,75 @@
           <a:lstStyle/>
           <a:p>
             <a:r>
+              <a:rPr lang="en-US" sz="2000" dirty="0" smtClean="0"/>
+              <a:t>Erin Becker</a:t>
+            </a:r>
+            <a:endParaRPr lang="en-US" sz="2000" dirty="0"/>
+          </a:p>
+          <a:p>
+            <a:r>
+              <a:rPr lang="en-US" sz="2000" dirty="0" smtClean="0"/>
+              <a:t>Associate Director, The Carpentries</a:t>
+            </a:r>
+            <a:endParaRPr lang="en-US" sz="2000" dirty="0"/>
+          </a:p>
+          <a:p>
+            <a:r>
               <a:rPr lang="en-US" sz="2000" dirty="0"/>
-              <a:t>&lt;your name&gt;</a:t>
-            </a:r>
+              <a:t>Email</a:t>
+            </a:r>
+            <a:r>
+              <a:rPr lang="en-US" sz="2000" dirty="0" smtClean="0"/>
+              <a:t>: </a:t>
+            </a:r>
+            <a:r>
+              <a:rPr lang="en-US" sz="2000" dirty="0" smtClean="0">
+                <a:hlinkClick r:id="rId3"/>
+              </a:rPr>
+              <a:t>ebecker@carpentries.org</a:t>
+            </a:r>
+            <a:r>
+              <a:rPr lang="en-US" sz="2000" dirty="0" smtClean="0"/>
+              <a:t> </a:t>
+            </a:r>
+            <a:endParaRPr lang="en-US" sz="2000" dirty="0"/>
           </a:p>
           <a:p>
             <a:r>
               <a:rPr lang="en-US" sz="2000" dirty="0"/>
-              <a:t>&lt;your organization&gt;</a:t>
-            </a:r>
-          </a:p>
-          <a:p>
+              <a:t>Website</a:t>
+            </a:r>
+            <a:r>
+              <a:rPr lang="en-US" sz="2000" dirty="0" smtClean="0"/>
+              <a:t>:</a:t>
+            </a:r>
             <a:r>
               <a:rPr lang="en-US" sz="2000" dirty="0"/>
-              <a:t>Email:</a:t>
-            </a:r>
-          </a:p>
-          <a:p>
-            <a:r>
-              <a:rPr lang="en-US" sz="2000" dirty="0"/>
-              <a:t>Website:</a:t>
-            </a:r>
-          </a:p>
-          <a:p>
-            <a:r>
-              <a:rPr lang="en-US" sz="2000" dirty="0"/>
-              <a:t>Phone:</a:t>
-            </a:r>
+              <a:t> </a:t>
+            </a:r>
+            <a:r>
+              <a:rPr lang="en-US" sz="2000" dirty="0" smtClean="0">
+                <a:hlinkClick r:id="rId4"/>
+              </a:rPr>
+              <a:t>https</a:t>
+            </a:r>
+            <a:r>
+              <a:rPr lang="en-US" sz="2000" smtClean="0">
+                <a:hlinkClick r:id="rId4"/>
+              </a:rPr>
+              <a:t>://</a:t>
+            </a:r>
+            <a:r>
+              <a:rPr lang="en-US" sz="2000" smtClean="0">
+                <a:hlinkClick r:id="rId4"/>
+              </a:rPr>
+              <a:t>github.com/ErinBecker/digital-humanities-phylogenetics</a:t>
+            </a:r>
+            <a:r>
+              <a:rPr lang="en-US" sz="2000" smtClean="0"/>
+              <a:t> </a:t>
+            </a:r>
+            <a:endParaRPr lang="en-US" sz="2000" dirty="0"/>
           </a:p>
         </p:txBody>
       </p:sp>
@@ -5217,140 +5235,49 @@
           </a:bodyPr>
           <a:lstStyle/>
           <a:p>
-            <a:pPr marL="244855" indent="-244855">
-              <a:buFont typeface="+mj-lt"/>
-              <a:buAutoNum type="arabicPeriod"/>
-            </a:pPr>
-            <a:r>
-              <a:rPr lang="en-US" sz="900" dirty="0"/>
+            <a:r>
+              <a:rPr lang="en-US" sz="2000" dirty="0" smtClean="0"/>
+              <a:t>Niek Veldhuis</a:t>
+            </a:r>
+          </a:p>
+          <a:p>
+            <a:r>
+              <a:rPr lang="en-US" sz="2000" dirty="0" smtClean="0"/>
+              <a:t>Professor of Assyriology, Dept. of Near Eastern Studies, UC Berkeley</a:t>
+            </a:r>
+          </a:p>
+          <a:p>
+            <a:r>
+              <a:rPr lang="en-US" sz="2000" dirty="0" smtClean="0"/>
+              <a:t>Email: </a:t>
+            </a:r>
+            <a:r>
+              <a:rPr lang="en-US" sz="2000" dirty="0" smtClean="0">
+                <a:hlinkClick r:id="rId5"/>
+              </a:rPr>
+              <a:t>veldhuis@berkeley.edu</a:t>
+            </a:r>
+            <a:endParaRPr lang="en-US" sz="2000" dirty="0" smtClean="0"/>
+          </a:p>
+          <a:p>
+            <a:r>
+              <a:rPr lang="en-US" sz="2000" dirty="0" smtClean="0"/>
+              <a:t>Website: </a:t>
+            </a:r>
+            <a:r>
+              <a:rPr lang="en-US" sz="2000" dirty="0" smtClean="0">
+                <a:hlinkClick r:id="rId6"/>
+              </a:rPr>
+              <a:t>http://oracc.org/dcclt</a:t>
+            </a:r>
+            <a:r>
+              <a:rPr lang="en-US" sz="2000" dirty="0" smtClean="0"/>
               <a:t> </a:t>
             </a:r>
-          </a:p>
-          <a:p>
-            <a:pPr marL="244855" indent="-244855">
-              <a:buFont typeface="+mj-lt"/>
-              <a:buAutoNum type="arabicPeriod"/>
-            </a:pPr>
-            <a:r>
-              <a:rPr lang="en-US" sz="900" dirty="0"/>
-              <a:t> </a:t>
-            </a:r>
-          </a:p>
-          <a:p>
-            <a:pPr marL="244855" indent="-244855">
-              <a:buFont typeface="+mj-lt"/>
-              <a:buAutoNum type="arabicPeriod"/>
-            </a:pPr>
-            <a:r>
-              <a:rPr lang="en-US" sz="900" dirty="0"/>
-              <a:t> </a:t>
-            </a:r>
-          </a:p>
-          <a:p>
-            <a:pPr marL="244855" indent="-244855">
-              <a:buFont typeface="+mj-lt"/>
-              <a:buAutoNum type="arabicPeriod"/>
-            </a:pPr>
-            <a:r>
-              <a:rPr lang="en-US" sz="900" dirty="0"/>
-              <a:t> </a:t>
-            </a:r>
-          </a:p>
-          <a:p>
-            <a:pPr marL="244855" indent="-244855">
-              <a:buFont typeface="+mj-lt"/>
-              <a:buAutoNum type="arabicPeriod"/>
-            </a:pPr>
-            <a:r>
-              <a:rPr lang="en-US" sz="900" dirty="0"/>
-              <a:t> </a:t>
-            </a:r>
-          </a:p>
-          <a:p>
-            <a:pPr marL="244855" indent="-244855">
-              <a:buFont typeface="+mj-lt"/>
-              <a:buAutoNum type="arabicPeriod"/>
-            </a:pPr>
-            <a:r>
-              <a:rPr lang="en-US" sz="900" dirty="0"/>
-              <a:t> </a:t>
-            </a:r>
-          </a:p>
-          <a:p>
-            <a:pPr marL="244855" indent="-244855">
-              <a:buFont typeface="+mj-lt"/>
-              <a:buAutoNum type="arabicPeriod"/>
-            </a:pPr>
-            <a:r>
-              <a:rPr lang="en-US" sz="900" dirty="0"/>
-              <a:t> </a:t>
-            </a:r>
-          </a:p>
-          <a:p>
-            <a:pPr marL="244855" indent="-244855">
-              <a:buFont typeface="+mj-lt"/>
-              <a:buAutoNum type="arabicPeriod"/>
-            </a:pPr>
-            <a:r>
-              <a:rPr lang="en-US" sz="900" dirty="0"/>
-              <a:t> </a:t>
-            </a:r>
-          </a:p>
-          <a:p>
-            <a:pPr marL="244855" indent="-244855">
-              <a:buFont typeface="+mj-lt"/>
-              <a:buAutoNum type="arabicPeriod"/>
-            </a:pPr>
-            <a:r>
-              <a:rPr lang="en-US" sz="900" dirty="0"/>
-              <a:t> </a:t>
-            </a:r>
-          </a:p>
-          <a:p>
-            <a:pPr marL="244855" indent="-244855">
-              <a:buFont typeface="+mj-lt"/>
-              <a:buAutoNum type="arabicPeriod"/>
-            </a:pPr>
-            <a:r>
-              <a:rPr lang="en-US" sz="900" dirty="0"/>
-              <a:t>  </a:t>
-            </a:r>
-          </a:p>
-          <a:p>
-            <a:pPr marL="244855" indent="-244855">
-              <a:buFont typeface="+mj-lt"/>
-              <a:buAutoNum type="arabicPeriod"/>
-            </a:pPr>
+            <a:endParaRPr lang="en-US" sz="2000" dirty="0" smtClean="0"/>
+          </a:p>
+          <a:p>
             <a:endParaRPr lang="en-US" sz="900" dirty="0"/>
-          </a:p>
-        </p:txBody>
-      </p:sp>
-      <p:sp>
-        <p:nvSpPr>
-          <p:cNvPr id="27" name="TextBox 26"/>
-          <p:cNvSpPr txBox="1"/>
-          <p:nvPr/>
-        </p:nvSpPr>
-        <p:spPr>
-          <a:xfrm>
-            <a:off x="16459202" y="19431001"/>
-            <a:ext cx="2026670" cy="557282"/>
-          </a:xfrm>
-          <a:prstGeom prst="rect">
-            <a:avLst/>
-          </a:prstGeom>
-          <a:noFill/>
-        </p:spPr>
-        <p:txBody>
-          <a:bodyPr wrap="none" lIns="48971" tIns="24486" rIns="48971" bIns="24486" rtlCol="0">
-            <a:spAutoFit/>
-          </a:bodyPr>
-          <a:lstStyle/>
-          <a:p>
-            <a:r>
-              <a:rPr lang="en-US" sz="3200" b="1" dirty="0"/>
-              <a:t>References</a:t>
-            </a:r>
           </a:p>
         </p:txBody>
       </p:sp>
@@ -5671,7 +5598,7 @@
             <a:r>
               <a:rPr lang="en-US" sz="2000" dirty="0">
                 <a:latin typeface="+mn-lt"/>
-                <a:hlinkClick r:id="rId3"/>
+                <a:hlinkClick r:id="rId7"/>
               </a:rPr>
               <a:t>http://oracc.org</a:t>
             </a:r>
@@ -6730,144 +6657,6 @@
           </a:p>
         </p:txBody>
       </p:sp>
-      <p:sp>
-        <p:nvSpPr>
-          <p:cNvPr id="30" name="Rectangle 265"/>
-          <p:cNvSpPr>
-            <a:spLocks noChangeAspect="1" noChangeArrowheads="1"/>
-          </p:cNvSpPr>
-          <p:nvPr/>
-        </p:nvSpPr>
-        <p:spPr bwMode="auto">
-          <a:xfrm>
-            <a:off x="1097280" y="731520"/>
-            <a:ext cx="1827358" cy="1371600"/>
-          </a:xfrm>
-          <a:prstGeom prst="rect">
-            <a:avLst/>
-          </a:prstGeom>
-          <a:blipFill dpi="0" rotWithShape="1">
-            <a:blip r:embed="rId4">
-              <a:lum bright="70000" contrast="-70000"/>
-            </a:blip>
-            <a:srcRect/>
-            <a:stretch>
-              <a:fillRect r="-79"/>
-            </a:stretch>
-          </a:blipFill>
-          <a:ln w="9525">
-            <a:solidFill>
-              <a:schemeClr val="tx1"/>
-            </a:solidFill>
-            <a:miter lim="800000"/>
-            <a:headEnd/>
-            <a:tailEnd/>
-          </a:ln>
-          <a:effectLst/>
-          <a:extLst>
-            <a:ext uri="{AF507438-7753-43E0-B8FC-AC1667EBCBE1}">
-              <a14:hiddenEffects xmlns:a14="http://schemas.microsoft.com/office/drawing/2010/main">
-                <a:effectLst>
-                  <a:outerShdw dist="35921" dir="2700000" algn="ctr" rotWithShape="0">
-                    <a:schemeClr val="bg2"/>
-                  </a:outerShdw>
-                </a:effectLst>
-              </a14:hiddenEffects>
-            </a:ext>
-          </a:extLst>
-        </p:spPr>
-        <p:txBody>
-          <a:bodyPr lIns="83814" tIns="41907" rIns="83814" bIns="41907" anchor="ctr"/>
-          <a:lstStyle/>
-          <a:p>
-            <a:pPr algn="ctr" defTabSz="4022725"/>
-            <a:r>
-              <a:rPr lang="en-US" sz="1200" b="1" dirty="0">
-                <a:latin typeface="Calibri" pitchFamily="34" charset="0"/>
-              </a:rPr>
-              <a:t>REPLACE THIS BOX WITH YOUR ORGANIZATION’S</a:t>
-            </a:r>
-          </a:p>
-          <a:p>
-            <a:pPr algn="ctr" defTabSz="4022725"/>
-            <a:r>
-              <a:rPr lang="en-US" sz="1200" b="1" dirty="0">
-                <a:latin typeface="Calibri" pitchFamily="34" charset="0"/>
-              </a:rPr>
-              <a:t>HIGH RESOLUTION LOGO</a:t>
-            </a:r>
-          </a:p>
-        </p:txBody>
-      </p:sp>
-      <p:sp>
-        <p:nvSpPr>
-          <p:cNvPr id="31" name="Rectangle 265"/>
-          <p:cNvSpPr>
-            <a:spLocks noChangeAspect="1" noChangeArrowheads="1"/>
-          </p:cNvSpPr>
-          <p:nvPr/>
-        </p:nvSpPr>
-        <p:spPr bwMode="auto">
-          <a:xfrm>
-            <a:off x="29992320" y="731520"/>
-            <a:ext cx="1827358" cy="1371600"/>
-          </a:xfrm>
-          <a:prstGeom prst="rect">
-            <a:avLst/>
-          </a:prstGeom>
-          <a:blipFill dpi="0" rotWithShape="1">
-            <a:blip r:embed="rId4">
-              <a:lum bright="70000" contrast="-70000"/>
-            </a:blip>
-            <a:srcRect/>
-            <a:stretch>
-              <a:fillRect r="-79"/>
-            </a:stretch>
-          </a:blipFill>
-          <a:ln w="9525">
-            <a:solidFill>
-              <a:schemeClr val="tx1"/>
-            </a:solidFill>
-            <a:miter lim="800000"/>
-            <a:headEnd/>
-            <a:tailEnd/>
-          </a:ln>
-          <a:effectLst/>
-          <a:extLst>
-            <a:ext uri="{AF507438-7753-43E0-B8FC-AC1667EBCBE1}">
-              <a14:hiddenEffects xmlns:a14="http://schemas.microsoft.com/office/drawing/2010/main">
-                <a:effectLst>
-                  <a:outerShdw dist="35921" dir="2700000" algn="ctr" rotWithShape="0">
-                    <a:schemeClr val="bg2"/>
-                  </a:outerShdw>
-                </a:effectLst>
-              </a14:hiddenEffects>
-            </a:ext>
-          </a:extLst>
-        </p:spPr>
-        <p:txBody>
-          <a:bodyPr lIns="83814" tIns="41907" rIns="83814" bIns="41907" anchor="ctr"/>
-          <a:lstStyle/>
-          <a:p>
-            <a:pPr algn="ctr" defTabSz="4022725"/>
-            <a:r>
-              <a:rPr lang="en-US" sz="1200" b="1" dirty="0">
-                <a:latin typeface="Calibri" pitchFamily="34" charset="0"/>
-              </a:rPr>
-              <a:t>REPLACE THIS BOX WITH YOUR ORGANIZATION’S</a:t>
-            </a:r>
-          </a:p>
-          <a:p>
-            <a:pPr algn="ctr" defTabSz="4022725"/>
-            <a:r>
-              <a:rPr lang="en-US" sz="1200" b="1" dirty="0">
-                <a:latin typeface="Calibri" pitchFamily="34" charset="0"/>
-              </a:rPr>
-              <a:t>HIGH RESOLUTION LOGO</a:t>
-            </a:r>
-          </a:p>
-        </p:txBody>
-      </p:sp>
       <p:pic>
         <p:nvPicPr>
           <p:cNvPr id="1031" name="Picture 7"/>
@@ -6877,7 +6666,7 @@
           <p:nvPr/>
         </p:nvPicPr>
         <p:blipFill>
-          <a:blip r:embed="rId5">
+          <a:blip r:embed="rId8">
             <a:extLst>
               <a:ext uri="{28A0092B-C50C-407E-A947-70E740481C1C}">
                 <a14:useLocalDpi xmlns:a14="http://schemas.microsoft.com/office/drawing/2010/main" val="0"/>
@@ -7026,7 +6815,7 @@
           <p:nvPr/>
         </p:nvPicPr>
         <p:blipFill>
-          <a:blip r:embed="rId6" cstate="print">
+          <a:blip r:embed="rId9" cstate="print">
             <a:extLst>
               <a:ext uri="{28A0092B-C50C-407E-A947-70E740481C1C}">
                 <a14:useLocalDpi xmlns:a14="http://schemas.microsoft.com/office/drawing/2010/main" val="0"/>
@@ -7621,15 +7410,7 @@
           <a:p>
             <a:r>
               <a:rPr lang="en-US" sz="1600" dirty="0" smtClean="0"/>
-              <a:t>The section “bow” is defined by a sequence of lemmas that share a sequence of at least 3 characters either in the Sumerian Citation Form or in the English Guide Word. Square brackets and Part of Speech are ignored. The word for “trap</a:t>
-            </a:r>
-            <a:r>
-              <a:rPr lang="en-US" sz="1600" dirty="0" smtClean="0"/>
-              <a:t>” is </a:t>
-            </a:r>
-            <a:r>
-              <a:rPr lang="en-US" sz="1600" dirty="0" smtClean="0"/>
-              <a:t>the beginning of a new section</a:t>
+              <a:t>The section “bow” is defined by a sequence of lemmas that share a sequence of at least 3 characters either in the Sumerian Citation Form or in the English Guide Word. Square brackets and Part of Speech are ignored. The word for “trap” is the beginning of a new section</a:t>
             </a:r>
             <a:endParaRPr lang="en-US" sz="1600" dirty="0"/>
           </a:p>
@@ -7644,7 +7425,7 @@
           <p:nvPr/>
         </p:nvPicPr>
         <p:blipFill>
-          <a:blip r:embed="rId7">
+          <a:blip r:embed="rId10">
             <a:extLst>
               <a:ext uri="{28A0092B-C50C-407E-A947-70E740481C1C}">
                 <a14:useLocalDpi xmlns:a14="http://schemas.microsoft.com/office/drawing/2010/main" val="0"/>
@@ -7663,6 +7444,111 @@
           <a:prstGeom prst="rect">
             <a:avLst/>
           </a:prstGeom>
+        </p:spPr>
+      </p:pic>
+      <p:pic>
+        <p:nvPicPr>
+          <p:cNvPr id="28" name="Picture 2" descr="C:\Users\veldhuis\Downloads\logo-white.svg.png"/>
+          <p:cNvPicPr>
+            <a:picLocks noChangeAspect="1" noChangeArrowheads="1"/>
+          </p:cNvPicPr>
+          <p:nvPr/>
+        </p:nvPicPr>
+        <p:blipFill>
+          <a:blip r:embed="rId11">
+            <a:extLst>
+              <a:ext uri="{28A0092B-C50C-407E-A947-70E740481C1C}">
+                <a14:useLocalDpi xmlns:a14="http://schemas.microsoft.com/office/drawing/2010/main" val="0"/>
+              </a:ext>
+            </a:extLst>
+          </a:blip>
+          <a:srcRect/>
+          <a:stretch>
+            <a:fillRect/>
+          </a:stretch>
+        </p:blipFill>
+        <p:spPr bwMode="auto">
+          <a:xfrm>
+            <a:off x="1097279" y="1025107"/>
+            <a:ext cx="3968235" cy="803693"/>
+          </a:xfrm>
+          <a:prstGeom prst="rect">
+            <a:avLst/>
+          </a:prstGeom>
+          <a:noFill/>
+          <a:extLst>
+            <a:ext uri="{909E8E84-426E-40DD-AFC4-6F175D3DCCD1}">
+              <a14:hiddenFill xmlns:a14="http://schemas.microsoft.com/office/drawing/2010/main">
+                <a:solidFill>
+                  <a:srgbClr val="FFFFFF"/>
+                </a:solidFill>
+              </a14:hiddenFill>
+            </a:ext>
+          </a:extLst>
+        </p:spPr>
+      </p:pic>
+      <p:pic>
+        <p:nvPicPr>
+          <p:cNvPr id="1026" name="Picture 2"/>
+          <p:cNvPicPr>
+            <a:picLocks noChangeAspect="1" noChangeArrowheads="1"/>
+          </p:cNvPicPr>
+          <p:nvPr/>
+        </p:nvPicPr>
+        <p:blipFill>
+          <a:blip r:embed="rId12">
+            <a:extLst>
+              <a:ext uri="{28A0092B-C50C-407E-A947-70E740481C1C}">
+                <a14:useLocalDpi xmlns:a14="http://schemas.microsoft.com/office/drawing/2010/main" val="0"/>
+              </a:ext>
+            </a:extLst>
+          </a:blip>
+          <a:srcRect/>
+          <a:stretch>
+            <a:fillRect/>
+          </a:stretch>
+        </p:blipFill>
+        <p:spPr bwMode="auto">
+          <a:xfrm>
+            <a:off x="28876625" y="271463"/>
+            <a:ext cx="2292350" cy="2286000"/>
+          </a:xfrm>
+          <a:prstGeom prst="rect">
+            <a:avLst/>
+          </a:prstGeom>
+          <a:noFill/>
+          <a:ln>
+            <a:noFill/>
+          </a:ln>
+          <a:effectLst/>
+          <a:extLst>
+            <a:ext uri="{909E8E84-426E-40DD-AFC4-6F175D3DCCD1}">
+              <a14:hiddenFill xmlns:a14="http://schemas.microsoft.com/office/drawing/2010/main">
+                <a:solidFill>
+                  <a:schemeClr val="accent1"/>
+                </a:solidFill>
+              </a14:hiddenFill>
+            </a:ext>
+            <a:ext uri="{91240B29-F687-4F45-9708-019B960494DF}">
+              <a14:hiddenLine xmlns:a14="http://schemas.microsoft.com/office/drawing/2010/main" w="9525">
+                <a:solidFill>
+                  <a:schemeClr val="tx1"/>
+                </a:solidFill>
+                <a:miter lim="800000"/>
+                <a:headEnd/>
+                <a:tailEnd/>
+              </a14:hiddenLine>
+            </a:ext>
+            <a:ext uri="{AF507438-7753-43E0-B8FC-AC1667EBCBE1}">
+              <a14:hiddenEffects xmlns:a14="http://schemas.microsoft.com/office/drawing/2010/main">
+                <a:effectLst>
+                  <a:outerShdw dist="35921" dir="2700000" algn="ctr" rotWithShape="0">
+                    <a:schemeClr val="bg2"/>
+                  </a:outerShdw>
+                </a:effectLst>
+              </a14:hiddenEffects>
+            </a:ext>
+          </a:extLst>
         </p:spPr>
       </p:pic>
     </p:spTree>

</xml_diff>

<commit_message>
add SI fig to poster
</commit_message>
<xml_diff>
--- a/presentations/HTRC-2018/poster-template.pptx
+++ b/presentations/HTRC-2018/poster-template.pptx
@@ -109,7 +109,7 @@
   </p:defaultTextStyle>
   <p:extLst>
     <p:ext uri="{EFAFB233-063F-42B5-8137-9DF3F51BA10A}">
-      <p15:sldGuideLst xmlns:p15="http://schemas.microsoft.com/office/powerpoint/2012/main" xmlns="">
+      <p15:sldGuideLst xmlns:p15="http://schemas.microsoft.com/office/powerpoint/2012/main">
         <p15:guide id="1" orient="horz" pos="6912">
           <p15:clr>
             <a:srgbClr val="A4A3A4"/>
@@ -123,7 +123,7 @@
       </p15:sldGuideLst>
     </p:ext>
     <p:ext uri="{2D200454-40CA-4A62-9FC3-DE9A4176ACB9}">
-      <p15:notesGuideLst xmlns:p15="http://schemas.microsoft.com/office/powerpoint/2012/main" xmlns="">
+      <p15:notesGuideLst xmlns:p15="http://schemas.microsoft.com/office/powerpoint/2012/main">
         <p15:guide id="1" orient="horz" pos="2926">
           <p15:clr>
             <a:srgbClr val="A4A3A4"/>
@@ -222,7 +222,7 @@
           <a:p>
             <a:fld id="{FF66CDD7-09B6-4BB3-9069-2B95837CCCB2}" type="datetimeFigureOut">
               <a:rPr lang="en-US" smtClean="0"/>
-              <a:t>1/22/2018</a:t>
+              <a:t>1/22/18</a:t>
             </a:fld>
             <a:endParaRPr lang="en-US"/>
           </a:p>
@@ -436,7 +436,7 @@
           <a:p>
             <a:fld id="{985D6BDF-9D0E-4E2B-85B8-D8F4790360C9}" type="datetimeFigureOut">
               <a:rPr lang="en-US" smtClean="0"/>
-              <a:t>1/22/2018</a:t>
+              <a:t>1/22/18</a:t>
             </a:fld>
             <a:endParaRPr lang="en-US" dirty="0"/>
           </a:p>
@@ -601,7 +601,7 @@
           <a:p>
             <a:fld id="{985D6BDF-9D0E-4E2B-85B8-D8F4790360C9}" type="datetimeFigureOut">
               <a:rPr lang="en-US" smtClean="0"/>
-              <a:t>1/22/2018</a:t>
+              <a:t>1/22/18</a:t>
             </a:fld>
             <a:endParaRPr lang="en-US" dirty="0"/>
           </a:p>
@@ -776,7 +776,7 @@
           <a:p>
             <a:fld id="{985D6BDF-9D0E-4E2B-85B8-D8F4790360C9}" type="datetimeFigureOut">
               <a:rPr lang="en-US" smtClean="0"/>
-              <a:t>1/22/2018</a:t>
+              <a:t>1/22/18</a:t>
             </a:fld>
             <a:endParaRPr lang="en-US" dirty="0"/>
           </a:p>
@@ -2451,7 +2451,7 @@
           <a:p>
             <a:fld id="{985D6BDF-9D0E-4E2B-85B8-D8F4790360C9}" type="datetimeFigureOut">
               <a:rPr lang="en-US" smtClean="0"/>
-              <a:t>1/22/2018</a:t>
+              <a:t>1/22/18</a:t>
             </a:fld>
             <a:endParaRPr lang="en-US" dirty="0"/>
           </a:p>
@@ -2692,7 +2692,7 @@
           <a:p>
             <a:fld id="{985D6BDF-9D0E-4E2B-85B8-D8F4790360C9}" type="datetimeFigureOut">
               <a:rPr lang="en-US" smtClean="0"/>
-              <a:t>1/22/2018</a:t>
+              <a:t>1/22/18</a:t>
             </a:fld>
             <a:endParaRPr lang="en-US" dirty="0"/>
           </a:p>
@@ -2919,7 +2919,7 @@
           <a:p>
             <a:fld id="{985D6BDF-9D0E-4E2B-85B8-D8F4790360C9}" type="datetimeFigureOut">
               <a:rPr lang="en-US" smtClean="0"/>
-              <a:t>1/22/2018</a:t>
+              <a:t>1/22/18</a:t>
             </a:fld>
             <a:endParaRPr lang="en-US" dirty="0"/>
           </a:p>
@@ -3281,7 +3281,7 @@
           <a:p>
             <a:fld id="{985D6BDF-9D0E-4E2B-85B8-D8F4790360C9}" type="datetimeFigureOut">
               <a:rPr lang="en-US" smtClean="0"/>
-              <a:t>1/22/2018</a:t>
+              <a:t>1/22/18</a:t>
             </a:fld>
             <a:endParaRPr lang="en-US" dirty="0"/>
           </a:p>
@@ -3394,7 +3394,7 @@
           <a:p>
             <a:fld id="{985D6BDF-9D0E-4E2B-85B8-D8F4790360C9}" type="datetimeFigureOut">
               <a:rPr lang="en-US" smtClean="0"/>
-              <a:t>1/22/2018</a:t>
+              <a:t>1/22/18</a:t>
             </a:fld>
             <a:endParaRPr lang="en-US" dirty="0"/>
           </a:p>
@@ -3484,7 +3484,7 @@
           <a:p>
             <a:fld id="{985D6BDF-9D0E-4E2B-85B8-D8F4790360C9}" type="datetimeFigureOut">
               <a:rPr lang="en-US" smtClean="0"/>
-              <a:t>1/22/2018</a:t>
+              <a:t>1/22/18</a:t>
             </a:fld>
             <a:endParaRPr lang="en-US" dirty="0"/>
           </a:p>
@@ -3756,7 +3756,7 @@
           <a:p>
             <a:fld id="{985D6BDF-9D0E-4E2B-85B8-D8F4790360C9}" type="datetimeFigureOut">
               <a:rPr lang="en-US" smtClean="0"/>
-              <a:t>1/22/2018</a:t>
+              <a:t>1/22/18</a:t>
             </a:fld>
             <a:endParaRPr lang="en-US" dirty="0"/>
           </a:p>
@@ -4004,7 +4004,7 @@
           <a:p>
             <a:fld id="{985D6BDF-9D0E-4E2B-85B8-D8F4790360C9}" type="datetimeFigureOut">
               <a:rPr lang="en-US" smtClean="0"/>
-              <a:t>1/22/2018</a:t>
+              <a:t>1/22/18</a:t>
             </a:fld>
             <a:endParaRPr lang="en-US" dirty="0"/>
           </a:p>
@@ -4212,7 +4212,7 @@
           <a:p>
             <a:fld id="{985D6BDF-9D0E-4E2B-85B8-D8F4790360C9}" type="datetimeFigureOut">
               <a:rPr lang="en-US" smtClean="0"/>
-              <a:t>1/22/2018</a:t>
+              <a:t>1/22/18</a:t>
             </a:fld>
             <a:endParaRPr lang="en-US" dirty="0"/>
           </a:p>
@@ -5168,13 +5168,7 @@
               <a:rPr lang="en-US" sz="2000" smtClean="0">
                 <a:hlinkClick r:id="rId4"/>
               </a:rPr>
-              <a:t>://</a:t>
-            </a:r>
-            <a:r>
-              <a:rPr lang="en-US" sz="2000" smtClean="0">
-                <a:hlinkClick r:id="rId4"/>
-              </a:rPr>
-              <a:t>github.com/ErinBecker/digital-humanities-phylogenetics</a:t>
+              <a:t>://github.com/ErinBecker/digital-humanities-phylogenetics</a:t>
             </a:r>
             <a:r>
               <a:rPr lang="en-US" sz="2000" smtClean="0"/>
@@ -5274,7 +5268,6 @@
               <a:rPr lang="en-US" sz="2000" dirty="0" smtClean="0"/>
               <a:t> </a:t>
             </a:r>
-            <a:endParaRPr lang="en-US" sz="2000" dirty="0" smtClean="0"/>
           </a:p>
           <a:p>
             <a:endParaRPr lang="en-US" sz="900" dirty="0"/>
@@ -6195,7 +6188,7 @@
         </p:nvSpPr>
         <p:spPr bwMode="auto">
           <a:xfrm>
-            <a:off x="21945600" y="12524627"/>
+            <a:off x="21945600" y="16666730"/>
             <a:ext cx="9875520" cy="505573"/>
           </a:xfrm>
           <a:prstGeom prst="rect">
@@ -6331,7 +6324,7 @@
         </p:nvSpPr>
         <p:spPr>
           <a:xfrm>
-            <a:off x="21945600" y="12067427"/>
+            <a:off x="21945600" y="16209530"/>
             <a:ext cx="9875520" cy="457200"/>
           </a:xfrm>
           <a:prstGeom prst="rect">
@@ -7438,7 +7431,7 @@
         </p:blipFill>
         <p:spPr>
           <a:xfrm>
-            <a:off x="11496040" y="7445706"/>
+            <a:off x="11367676" y="7337334"/>
             <a:ext cx="6267577" cy="8093891"/>
           </a:xfrm>
           <a:prstGeom prst="rect">
@@ -7549,6 +7542,36 @@
               </a14:hiddenEffects>
             </a:ext>
           </a:extLst>
+        </p:spPr>
+      </p:pic>
+      <p:pic>
+        <p:nvPicPr>
+          <p:cNvPr id="9" name="Picture 8"/>
+          <p:cNvPicPr>
+            <a:picLocks noChangeAspect="1"/>
+          </p:cNvPicPr>
+          <p:nvPr/>
+        </p:nvPicPr>
+        <p:blipFill>
+          <a:blip r:embed="rId13">
+            <a:extLst>
+              <a:ext uri="{28A0092B-C50C-407E-A947-70E740481C1C}">
+                <a14:useLocalDpi xmlns:a14="http://schemas.microsoft.com/office/drawing/2010/main" val="0"/>
+              </a:ext>
+            </a:extLst>
+          </a:blip>
+          <a:stretch>
+            <a:fillRect/>
+          </a:stretch>
+        </p:blipFill>
+        <p:spPr>
+          <a:xfrm>
+            <a:off x="18004729" y="7353060"/>
+            <a:ext cx="3340017" cy="5943600"/>
+          </a:xfrm>
+          <a:prstGeom prst="rect">
+            <a:avLst/>
+          </a:prstGeom>
         </p:spPr>
       </p:pic>
     </p:spTree>
@@ -7826,7 +7849,7 @@
   <a:extraClrSchemeLst/>
   <a:extLst>
     <a:ext uri="{05A4C25C-085E-4340-85A3-A5531E510DB2}">
-      <thm15:themeFamily xmlns:thm15="http://schemas.microsoft.com/office/thememl/2012/main" xmlns="" name="Office Theme" id="{62F939B6-93AF-4DB8-9C6B-D6C7DFDC589F}" vid="{4A3C46E8-61CC-4603-A589-7422A47A8E4A}"/>
+      <thm15:themeFamily xmlns:thm15="http://schemas.microsoft.com/office/thememl/2012/main" name="Office Theme" id="{62F939B6-93AF-4DB8-9C6B-D6C7DFDC589F}" vid="{4A3C46E8-61CC-4603-A589-7422A47A8E4A}"/>
     </a:ext>
   </a:extLst>
 </a:theme>

</xml_diff>

<commit_message>
add intro to phylogenetics
</commit_message>
<xml_diff>
--- a/presentations/HTRC-2018/poster-template.pptx
+++ b/presentations/HTRC-2018/poster-template.pptx
@@ -5025,7 +5025,7 @@
               <a:t>Erin Becker, Associate Director, The </a:t>
             </a:r>
             <a:r>
-              <a:rPr lang="en-US" sz="2800" smtClean="0">
+              <a:rPr lang="en-US" sz="2800" dirty="0" smtClean="0">
                 <a:solidFill>
                   <a:schemeClr val="accent3">
                     <a:lumMod val="20000"/>
@@ -5034,7 +5034,7 @@
                 </a:solidFill>
                 <a:latin typeface="+mn-lt"/>
               </a:rPr>
-              <a:t>Carpentries and </a:t>
+              <a:t>Carpentries &amp; </a:t>
             </a:r>
             <a:r>
               <a:rPr lang="en-US" sz="2800" dirty="0" smtClean="0">
@@ -5046,31 +5046,7 @@
                 </a:solidFill>
                 <a:latin typeface="+mn-lt"/>
               </a:rPr>
-              <a:t>Niek Veldhuis, Professor </a:t>
-            </a:r>
-            <a:r>
-              <a:rPr lang="en-US" sz="2800" smtClean="0">
-                <a:solidFill>
-                  <a:schemeClr val="accent3">
-                    <a:lumMod val="20000"/>
-                    <a:lumOff val="80000"/>
-                  </a:schemeClr>
-                </a:solidFill>
-                <a:latin typeface="+mn-lt"/>
-              </a:rPr>
-              <a:t>of Assyriology, UC </a:t>
-            </a:r>
-            <a:r>
-              <a:rPr lang="en-US" sz="2800" dirty="0" smtClean="0">
-                <a:solidFill>
-                  <a:schemeClr val="accent3">
-                    <a:lumMod val="20000"/>
-                    <a:lumOff val="80000"/>
-                  </a:schemeClr>
-                </a:solidFill>
-                <a:latin typeface="+mn-lt"/>
-              </a:rPr>
-              <a:t>Berkeley, Department of Near Eastern Studies</a:t>
+              <a:t>Niek Veldhuis, Professor of Assyriology, UC Berkeley, Department of Near Eastern Studies</a:t>
             </a:r>
             <a:endParaRPr lang="en-US" sz="2800" baseline="30000" dirty="0">
               <a:solidFill>
@@ -5986,7 +5962,7 @@
         <p:spPr bwMode="auto">
           <a:xfrm>
             <a:off x="11521440" y="3657600"/>
-            <a:ext cx="9875520" cy="505573"/>
+            <a:ext cx="9875520" cy="3583339"/>
           </a:xfrm>
           <a:prstGeom prst="rect">
             <a:avLst/>
@@ -6107,6 +6083,57 @@
           </a:lstStyle>
           <a:p>
             <a:pPr eaLnBrk="1" hangingPunct="1"/>
+            <a:r>
+              <a:rPr lang="en-US" sz="2000" dirty="0" smtClean="0">
+                <a:latin typeface="Calibri" pitchFamily="34" charset="0"/>
+              </a:rPr>
+              <a:t>Phylogenetics is a field of evolutionary biology which uses patterns of similarity and difference among organisms to make hypotheses about relatedness. Hypothesized relationships are displayed as trees where more closely related organisms are separated by fewer branching points and/or shorter total branch length. </a:t>
+            </a:r>
+          </a:p>
+          <a:p>
+            <a:pPr eaLnBrk="1" hangingPunct="1"/>
+            <a:r>
+              <a:rPr lang="en-US" sz="2000" dirty="0" smtClean="0">
+                <a:latin typeface="Calibri" pitchFamily="34" charset="0"/>
+              </a:rPr>
+              <a:t>                               </a:t>
+            </a:r>
+          </a:p>
+          <a:p>
+            <a:pPr eaLnBrk="1" hangingPunct="1"/>
+            <a:r>
+              <a:rPr lang="en-US" sz="2000" dirty="0">
+                <a:latin typeface="Calibri" pitchFamily="34" charset="0"/>
+              </a:rPr>
+              <a:t>	</a:t>
+            </a:r>
+            <a:r>
+              <a:rPr lang="en-US" sz="2000" dirty="0" smtClean="0">
+                <a:latin typeface="Calibri" pitchFamily="34" charset="0"/>
+              </a:rPr>
+              <a:t>Species X is most closely related to Species Y. Both are next most   	closely related to Species W and most distantly related to Species Z. </a:t>
+            </a:r>
+          </a:p>
+          <a:p>
+            <a:pPr eaLnBrk="1" hangingPunct="1"/>
+            <a:endParaRPr lang="en-US" sz="2000" dirty="0" smtClean="0">
+              <a:latin typeface="Calibri" pitchFamily="34" charset="0"/>
+            </a:endParaRPr>
+          </a:p>
+          <a:p>
+            <a:pPr eaLnBrk="1" hangingPunct="1"/>
+            <a:endParaRPr lang="en-US" sz="2000" dirty="0" smtClean="0">
+              <a:latin typeface="Calibri" pitchFamily="34" charset="0"/>
+            </a:endParaRPr>
+          </a:p>
+          <a:p>
+            <a:pPr eaLnBrk="1" hangingPunct="1"/>
+            <a:r>
+              <a:rPr lang="en-US" sz="2000" dirty="0" smtClean="0">
+                <a:latin typeface="Calibri" pitchFamily="34" charset="0"/>
+              </a:rPr>
+              <a:t>Patterns in DNA sequences, protein sequences, gene order, morphological characters, or others can be used to make phylogenetic hypotheses.</a:t>
+            </a:r>
             <a:endParaRPr lang="en-US" sz="2000" dirty="0">
               <a:latin typeface="Calibri" pitchFamily="34" charset="0"/>
             </a:endParaRPr>
@@ -7293,53 +7320,12 @@
         </p:blipFill>
         <p:spPr>
           <a:xfrm>
-            <a:off x="11367676" y="7337334"/>
+            <a:off x="11435130" y="9355909"/>
             <a:ext cx="6267577" cy="8093891"/>
           </a:xfrm>
           <a:prstGeom prst="rect">
             <a:avLst/>
           </a:prstGeom>
-        </p:spPr>
-      </p:pic>
-      <p:pic>
-        <p:nvPicPr>
-          <p:cNvPr id="28" name="Picture 2" descr="C:\Users\veldhuis\Downloads\logo-white.svg.png"/>
-          <p:cNvPicPr>
-            <a:picLocks noChangeAspect="1" noChangeArrowheads="1"/>
-          </p:cNvPicPr>
-          <p:nvPr/>
-        </p:nvPicPr>
-        <p:blipFill>
-          <a:blip r:embed="rId11">
-            <a:extLst>
-              <a:ext uri="{28A0092B-C50C-407E-A947-70E740481C1C}">
-                <a14:useLocalDpi xmlns:a14="http://schemas.microsoft.com/office/drawing/2010/main" val="0"/>
-              </a:ext>
-            </a:extLst>
-          </a:blip>
-          <a:srcRect/>
-          <a:stretch>
-            <a:fillRect/>
-          </a:stretch>
-        </p:blipFill>
-        <p:spPr bwMode="auto">
-          <a:xfrm>
-            <a:off x="1097279" y="1025107"/>
-            <a:ext cx="3968235" cy="803693"/>
-          </a:xfrm>
-          <a:prstGeom prst="rect">
-            <a:avLst/>
-          </a:prstGeom>
-          <a:noFill/>
-          <a:extLst>
-            <a:ext uri="{909E8E84-426E-40DD-AFC4-6F175D3DCCD1}">
-              <a14:hiddenFill xmlns:a14="http://schemas.microsoft.com/office/drawing/2010/main">
-                <a:solidFill>
-                  <a:srgbClr val="FFFFFF"/>
-                </a:solidFill>
-              </a14:hiddenFill>
-            </a:ext>
-          </a:extLst>
         </p:spPr>
       </p:pic>
       <p:pic>
@@ -7351,7 +7337,7 @@
           <p:nvPr/>
         </p:nvPicPr>
         <p:blipFill>
-          <a:blip r:embed="rId12">
+          <a:blip r:embed="rId11">
             <a:extLst>
               <a:ext uri="{28A0092B-C50C-407E-A947-70E740481C1C}">
                 <a14:useLocalDpi xmlns:a14="http://schemas.microsoft.com/office/drawing/2010/main" val="0"/>
@@ -7415,7 +7401,7 @@
           <p:nvPr/>
         </p:nvPicPr>
         <p:blipFill>
-          <a:blip r:embed="rId13">
+          <a:blip r:embed="rId12">
             <a:extLst>
               <a:ext uri="{28A0092B-C50C-407E-A947-70E740481C1C}">
                 <a14:useLocalDpi xmlns:a14="http://schemas.microsoft.com/office/drawing/2010/main" val="0"/>
@@ -7428,7 +7414,7 @@
         </p:blipFill>
         <p:spPr>
           <a:xfrm>
-            <a:off x="18004729" y="7353060"/>
+            <a:off x="18072183" y="9371635"/>
             <a:ext cx="3340017" cy="5943600"/>
           </a:xfrm>
           <a:prstGeom prst="rect">
@@ -7445,7 +7431,7 @@
           <p:nvPr/>
         </p:nvPicPr>
         <p:blipFill>
-          <a:blip r:embed="rId14">
+          <a:blip r:embed="rId13">
             <a:extLst>
               <a:ext uri="{28A0092B-C50C-407E-A947-70E740481C1C}">
                 <a14:useLocalDpi xmlns:a14="http://schemas.microsoft.com/office/drawing/2010/main" val="0"/>
@@ -7504,6 +7490,60 @@
           </a:p>
         </p:txBody>
       </p:sp>
+      <p:pic>
+        <p:nvPicPr>
+          <p:cNvPr id="12" name="Picture 11"/>
+          <p:cNvPicPr>
+            <a:picLocks noChangeAspect="1"/>
+          </p:cNvPicPr>
+          <p:nvPr/>
+        </p:nvPicPr>
+        <p:blipFill>
+          <a:blip r:embed="rId14"/>
+          <a:stretch>
+            <a:fillRect/>
+          </a:stretch>
+        </p:blipFill>
+        <p:spPr>
+          <a:xfrm>
+            <a:off x="230868" y="642368"/>
+            <a:ext cx="5750832" cy="1188720"/>
+          </a:xfrm>
+          <a:prstGeom prst="rect">
+            <a:avLst/>
+          </a:prstGeom>
+        </p:spPr>
+      </p:pic>
+      <p:pic>
+        <p:nvPicPr>
+          <p:cNvPr id="18" name="Picture 17"/>
+          <p:cNvPicPr>
+            <a:picLocks noChangeAspect="1"/>
+          </p:cNvPicPr>
+          <p:nvPr/>
+        </p:nvPicPr>
+        <p:blipFill>
+          <a:blip r:embed="rId15">
+            <a:extLst>
+              <a:ext uri="{28A0092B-C50C-407E-A947-70E740481C1C}">
+                <a14:useLocalDpi xmlns:a14="http://schemas.microsoft.com/office/drawing/2010/main" val="0"/>
+              </a:ext>
+            </a:extLst>
+          </a:blip>
+          <a:stretch>
+            <a:fillRect/>
+          </a:stretch>
+        </p:blipFill>
+        <p:spPr>
+          <a:xfrm>
+            <a:off x="12420600" y="5212404"/>
+            <a:ext cx="1238865" cy="1097280"/>
+          </a:xfrm>
+          <a:prstGeom prst="rect">
+            <a:avLst/>
+          </a:prstGeom>
+        </p:spPr>
+      </p:pic>
     </p:spTree>
     <p:extLst>
       <p:ext uri="{BB962C8B-B14F-4D97-AF65-F5344CB8AC3E}">

</xml_diff>